<commit_message>
Slide notes and some demo notes added
</commit_message>
<xml_diff>
--- a/330/330.pptx
+++ b/330/330.pptx
@@ -744,6 +744,66 @@
               <a:buFontTx/>
               <a:buChar char="-"/>
             </a:pPr>
+            <a:r>
+              <a:rPr lang="en-US" b="1" dirty="0" smtClean="0">
+                <a:solidFill>
+                  <a:srgbClr val="000000"/>
+                </a:solidFill>
+                <a:latin typeface="Lucida Grande" charset="0"/>
+                <a:ea typeface="ＭＳ Ｐゴシック" charset="0"/>
+                <a:cs typeface="Lucida Grande" charset="0"/>
+                <a:sym typeface="Lucida Grande" charset="0"/>
+              </a:rPr>
+              <a:t>Play music in the background</a:t>
+            </a:r>
+          </a:p>
+          <a:p>
+            <a:pPr marL="250825" indent="-171450" eaLnBrk="1" hangingPunct="1">
+              <a:buFontTx/>
+              <a:buChar char="-"/>
+            </a:pPr>
+            <a:r>
+              <a:rPr lang="en-US" b="1" dirty="0" smtClean="0">
+                <a:solidFill>
+                  <a:srgbClr val="000000"/>
+                </a:solidFill>
+                <a:latin typeface="Lucida Grande" charset="0"/>
+                <a:ea typeface="ＭＳ Ｐゴシック" charset="0"/>
+                <a:cs typeface="Lucida Grande" charset="0"/>
+                <a:sym typeface="Lucida Grande" charset="0"/>
+              </a:rPr>
+              <a:t>Check</a:t>
+            </a:r>
+            <a:r>
+              <a:rPr lang="en-US" b="1" baseline="0" dirty="0" smtClean="0">
+                <a:solidFill>
+                  <a:srgbClr val="000000"/>
+                </a:solidFill>
+                <a:latin typeface="Lucida Grande" charset="0"/>
+                <a:ea typeface="ＭＳ Ｐゴシック" charset="0"/>
+                <a:cs typeface="Lucida Grande" charset="0"/>
+                <a:sym typeface="Lucida Grande" charset="0"/>
+              </a:rPr>
+              <a:t> a network source periodically</a:t>
+            </a:r>
+          </a:p>
+          <a:p>
+            <a:pPr marL="250825" indent="-171450" eaLnBrk="1" hangingPunct="1">
+              <a:buFontTx/>
+              <a:buChar char="-"/>
+            </a:pPr>
+            <a:r>
+              <a:rPr lang="en-US" b="1" baseline="0" dirty="0" smtClean="0">
+                <a:solidFill>
+                  <a:srgbClr val="000000"/>
+                </a:solidFill>
+                <a:latin typeface="Lucida Grande" charset="0"/>
+                <a:ea typeface="ＭＳ Ｐゴシック" charset="0"/>
+                <a:cs typeface="Lucida Grande" charset="0"/>
+                <a:sym typeface="Lucida Grande" charset="0"/>
+              </a:rPr>
+              <a:t>Listen for data from a local or remote resource</a:t>
+            </a:r>
             <a:endParaRPr lang="en-US" b="1" dirty="0">
               <a:solidFill>
                 <a:srgbClr val="000000"/>
@@ -839,6 +899,66 @@
               <a:buFontTx/>
               <a:buChar char="-"/>
             </a:pPr>
+            <a:r>
+              <a:rPr lang="en-US" b="1" dirty="0" smtClean="0">
+                <a:solidFill>
+                  <a:srgbClr val="000000"/>
+                </a:solidFill>
+                <a:latin typeface="Lucida Grande" charset="0"/>
+                <a:ea typeface="ＭＳ Ｐゴシック" charset="0"/>
+                <a:cs typeface="Lucida Grande" charset="0"/>
+                <a:sym typeface="Lucida Grande" charset="0"/>
+              </a:rPr>
+              <a:t>System broadcasts: screen is on/off, battery is low, picture was captured</a:t>
+            </a:r>
+          </a:p>
+          <a:p>
+            <a:pPr marL="250825" indent="-171450" eaLnBrk="1" hangingPunct="1">
+              <a:buFontTx/>
+              <a:buChar char="-"/>
+            </a:pPr>
+            <a:r>
+              <a:rPr lang="en-US" b="1" dirty="0" smtClean="0">
+                <a:solidFill>
+                  <a:srgbClr val="000000"/>
+                </a:solidFill>
+                <a:latin typeface="Lucida Grande" charset="0"/>
+                <a:ea typeface="ＭＳ Ｐゴシック" charset="0"/>
+                <a:cs typeface="Lucida Grande" charset="0"/>
+                <a:sym typeface="Lucida Grande" charset="0"/>
+              </a:rPr>
+              <a:t>Your app could initiate a broadcast (when data is available to be used by other apps) or react to broadcasts</a:t>
+            </a:r>
+          </a:p>
+          <a:p>
+            <a:pPr marL="250825" indent="-171450" eaLnBrk="1" hangingPunct="1">
+              <a:buFontTx/>
+              <a:buChar char="-"/>
+            </a:pPr>
+            <a:r>
+              <a:rPr lang="en-US" b="1" dirty="0" smtClean="0">
+                <a:solidFill>
+                  <a:srgbClr val="000000"/>
+                </a:solidFill>
+                <a:latin typeface="Lucida Grande" charset="0"/>
+                <a:ea typeface="ＭＳ Ｐゴシック" charset="0"/>
+                <a:cs typeface="Lucida Grande" charset="0"/>
+                <a:sym typeface="Lucida Grande" charset="0"/>
+              </a:rPr>
+              <a:t>Broadcasts</a:t>
+            </a:r>
+            <a:r>
+              <a:rPr lang="en-US" b="1" baseline="0" dirty="0" smtClean="0">
+                <a:solidFill>
+                  <a:srgbClr val="000000"/>
+                </a:solidFill>
+                <a:latin typeface="Lucida Grande" charset="0"/>
+                <a:ea typeface="ＭＳ Ｐゴシック" charset="0"/>
+                <a:cs typeface="Lucida Grande" charset="0"/>
+                <a:sym typeface="Lucida Grande" charset="0"/>
+              </a:rPr>
+              <a:t> don’t interact with the user (no UI) except via a notification in the Notification Bar</a:t>
+            </a:r>
             <a:endParaRPr lang="en-US" b="1" dirty="0">
               <a:solidFill>
                 <a:srgbClr val="000000"/>
@@ -956,7 +1076,73 @@
                 <a:cs typeface="Lucida Grande" charset="0"/>
                 <a:sym typeface="Lucida Grande" charset="0"/>
               </a:rPr>
-              <a:t> basically objects that hold data which pass from one activity to a service, or one activity to another activity, etc.</a:t>
+              <a:t> basically objects that hold data which pass from one activity to a service, or one activity to another activity, etc</a:t>
+            </a:r>
+            <a:r>
+              <a:rPr lang="en-US" b="1" baseline="0" dirty="0" smtClean="0">
+                <a:solidFill>
+                  <a:srgbClr val="000000"/>
+                </a:solidFill>
+                <a:latin typeface="Lucida Grande" charset="0"/>
+                <a:ea typeface="ＭＳ Ｐゴシック" charset="0"/>
+                <a:cs typeface="Lucida Grande" charset="0"/>
+                <a:sym typeface="Lucida Grande" charset="0"/>
+              </a:rPr>
+              <a:t>.</a:t>
+            </a:r>
+          </a:p>
+          <a:p>
+            <a:pPr marL="250825" indent="-171450" eaLnBrk="1" hangingPunct="1">
+              <a:buFontTx/>
+              <a:buChar char="-"/>
+            </a:pPr>
+            <a:r>
+              <a:rPr lang="en-US" b="1" baseline="0" dirty="0" smtClean="0">
+                <a:solidFill>
+                  <a:srgbClr val="000000"/>
+                </a:solidFill>
+                <a:latin typeface="Lucida Grande" charset="0"/>
+                <a:ea typeface="ＭＳ Ｐゴシック" charset="0"/>
+                <a:cs typeface="Lucida Grande" charset="0"/>
+                <a:sym typeface="Lucida Grande" charset="0"/>
+              </a:rPr>
+              <a:t>Broadcasts are communicated in the form of events</a:t>
+            </a:r>
+          </a:p>
+          <a:p>
+            <a:pPr marL="250825" indent="-171450" eaLnBrk="1" hangingPunct="1">
+              <a:buFontTx/>
+              <a:buChar char="-"/>
+            </a:pPr>
+            <a:r>
+              <a:rPr lang="en-US" b="1" baseline="0" dirty="0" smtClean="0">
+                <a:solidFill>
+                  <a:srgbClr val="000000"/>
+                </a:solidFill>
+                <a:latin typeface="Lucida Grande" charset="0"/>
+                <a:ea typeface="ＭＳ Ｐゴシック" charset="0"/>
+                <a:cs typeface="Lucida Grande" charset="0"/>
+                <a:sym typeface="Lucida Grande" charset="0"/>
+              </a:rPr>
+              <a:t>For security reasons, your app can’t directly start an activity in another app. Instead, you send an intent requesting that activity and the OS starts the activity on your app’s behalf</a:t>
+            </a:r>
+          </a:p>
+          <a:p>
+            <a:pPr marL="250825" indent="-171450" eaLnBrk="1" hangingPunct="1">
+              <a:buFontTx/>
+              <a:buChar char="-"/>
+            </a:pPr>
+            <a:r>
+              <a:rPr lang="en-US" b="1" baseline="0" dirty="0" smtClean="0">
+                <a:solidFill>
+                  <a:srgbClr val="000000"/>
+                </a:solidFill>
+                <a:latin typeface="Lucida Grande" charset="0"/>
+                <a:ea typeface="ＭＳ Ｐゴシック" charset="0"/>
+                <a:cs typeface="Lucida Grande" charset="0"/>
+                <a:sym typeface="Lucida Grande" charset="0"/>
+              </a:rPr>
+              <a:t>You can request service from another activity directly (call on it) or you can publish an intent and a “filter” describing the type of service you need and let the OS find appropriate activities for you (think of how the Share button works – your app is publishing some text and the OS is returning all the activities that could share that text: email, twitter, etc.</a:t>
             </a:r>
             <a:endParaRPr lang="en-US" b="1" dirty="0">
               <a:solidFill>
@@ -1054,6 +1240,30 @@
                 <a:spcPts val="450"/>
               </a:spcBef>
             </a:pPr>
+            <a:r>
+              <a:rPr lang="en-US" dirty="0" smtClean="0">
+                <a:solidFill>
+                  <a:srgbClr val="000000"/>
+                </a:solidFill>
+                <a:latin typeface="Times New Roman" charset="0"/>
+                <a:ea typeface="ＭＳ Ｐゴシック" charset="0"/>
+                <a:cs typeface="Times New Roman" charset="0"/>
+                <a:sym typeface="Times New Roman" charset="0"/>
+              </a:rPr>
+              <a:t>Much of this goes on behind the scenes without you having to worry a lot over it. But you can manage</a:t>
+            </a:r>
+            <a:r>
+              <a:rPr lang="en-US" baseline="0" dirty="0" smtClean="0">
+                <a:solidFill>
+                  <a:srgbClr val="000000"/>
+                </a:solidFill>
+                <a:latin typeface="Times New Roman" charset="0"/>
+                <a:ea typeface="ＭＳ Ｐゴシック" charset="0"/>
+                <a:cs typeface="Times New Roman" charset="0"/>
+                <a:sym typeface="Times New Roman" charset="0"/>
+              </a:rPr>
+              <a:t> the process and take specific actions to capitalize on this application architecture</a:t>
+            </a:r>
             <a:endParaRPr lang="en-US" dirty="0">
               <a:solidFill>
                 <a:srgbClr val="000000"/>
@@ -1149,6 +1359,273 @@
               <a:buFontTx/>
               <a:buChar char="-"/>
             </a:pPr>
+            <a:r>
+              <a:rPr lang="en-US" b="1" dirty="0" smtClean="0">
+                <a:solidFill>
+                  <a:srgbClr val="000000"/>
+                </a:solidFill>
+                <a:latin typeface="Lucida Grande" charset="0"/>
+                <a:ea typeface="ＭＳ Ｐゴシック" charset="0"/>
+                <a:cs typeface="Lucida Grande" charset="0"/>
+                <a:sym typeface="Lucida Grande" charset="0"/>
+              </a:rPr>
+              <a:t>Activities,</a:t>
+            </a:r>
+            <a:r>
+              <a:rPr lang="en-US" b="1" baseline="0" dirty="0" smtClean="0">
+                <a:solidFill>
+                  <a:srgbClr val="000000"/>
+                </a:solidFill>
+                <a:latin typeface="Lucida Grande" charset="0"/>
+                <a:ea typeface="ＭＳ Ｐゴシック" charset="0"/>
+                <a:cs typeface="Lucida Grande" charset="0"/>
+                <a:sym typeface="Lucida Grande" charset="0"/>
+              </a:rPr>
+              <a:t> services, &amp; content providers not defined in the manifest are not visible to the OS and therefore cannot be started</a:t>
+            </a:r>
+          </a:p>
+          <a:p>
+            <a:pPr marL="250825" indent="-171450" eaLnBrk="1" hangingPunct="1">
+              <a:buFontTx/>
+              <a:buChar char="-"/>
+            </a:pPr>
+            <a:r>
+              <a:rPr lang="en-US" b="1" baseline="0" dirty="0" smtClean="0">
+                <a:solidFill>
+                  <a:srgbClr val="000000"/>
+                </a:solidFill>
+                <a:latin typeface="Lucida Grande" charset="0"/>
+                <a:ea typeface="ＭＳ Ｐゴシック" charset="0"/>
+                <a:cs typeface="Lucida Grande" charset="0"/>
+                <a:sym typeface="Lucida Grande" charset="0"/>
+              </a:rPr>
+              <a:t>Titanium adds these elements, but you could also define or configure them yourself</a:t>
+            </a:r>
+          </a:p>
+          <a:p>
+            <a:pPr marL="250825" indent="-171450" eaLnBrk="1" hangingPunct="1">
+              <a:buFontTx/>
+              <a:buChar char="-"/>
+            </a:pPr>
+            <a:r>
+              <a:rPr lang="en-US" b="1" baseline="0" dirty="0" smtClean="0">
+                <a:solidFill>
+                  <a:srgbClr val="000000"/>
+                </a:solidFill>
+                <a:latin typeface="Lucida Grande" charset="0"/>
+                <a:ea typeface="ＭＳ Ｐゴシック" charset="0"/>
+                <a:cs typeface="Lucida Grande" charset="0"/>
+                <a:sym typeface="Lucida Grande" charset="0"/>
+              </a:rPr>
+              <a:t>Also use the manifest to define hardware needs (orientation, screen size &amp; density, platform version)</a:t>
+            </a:r>
+            <a:endParaRPr lang="en-US" b="1" dirty="0" smtClean="0">
+              <a:solidFill>
+                <a:srgbClr val="000000"/>
+              </a:solidFill>
+              <a:latin typeface="Lucida Grande" charset="0"/>
+              <a:ea typeface="ＭＳ Ｐゴシック" charset="0"/>
+              <a:cs typeface="Lucida Grande" charset="0"/>
+              <a:sym typeface="Lucida Grande" charset="0"/>
+            </a:endParaRPr>
+          </a:p>
+          <a:p>
+            <a:pPr marL="250825" indent="-171450" eaLnBrk="1" hangingPunct="1">
+              <a:buFontTx/>
+              <a:buChar char="-"/>
+            </a:pPr>
+            <a:endParaRPr lang="en-US" b="1" dirty="0" smtClean="0">
+              <a:solidFill>
+                <a:srgbClr val="000000"/>
+              </a:solidFill>
+              <a:latin typeface="Lucida Grande" charset="0"/>
+              <a:ea typeface="ＭＳ Ｐゴシック" charset="0"/>
+              <a:cs typeface="Lucida Grande" charset="0"/>
+              <a:sym typeface="Lucida Grande" charset="0"/>
+            </a:endParaRPr>
+          </a:p>
+          <a:p>
+            <a:pPr marL="250825" indent="-171450" eaLnBrk="1" hangingPunct="1">
+              <a:buFontTx/>
+              <a:buChar char="-"/>
+            </a:pPr>
+            <a:r>
+              <a:rPr lang="en-US" b="1" dirty="0" smtClean="0">
+                <a:solidFill>
+                  <a:srgbClr val="000000"/>
+                </a:solidFill>
+                <a:latin typeface="Lucida Grande" charset="0"/>
+                <a:ea typeface="ＭＳ Ｐゴシック" charset="0"/>
+                <a:cs typeface="Lucida Grande" charset="0"/>
+                <a:sym typeface="Lucida Grande" charset="0"/>
+              </a:rPr>
+              <a:t>DEMO</a:t>
+            </a:r>
+          </a:p>
+          <a:p>
+            <a:pPr marL="250825" indent="-171450" eaLnBrk="1" hangingPunct="1">
+              <a:buFontTx/>
+              <a:buChar char="-"/>
+            </a:pPr>
+            <a:r>
+              <a:rPr lang="en-US" b="1" dirty="0" smtClean="0">
+                <a:solidFill>
+                  <a:srgbClr val="000000"/>
+                </a:solidFill>
+                <a:latin typeface="Lucida Grande" charset="0"/>
+                <a:ea typeface="ＭＳ Ｐゴシック" charset="0"/>
+                <a:cs typeface="Lucida Grande" charset="0"/>
+                <a:sym typeface="Lucida Grande" charset="0"/>
+              </a:rPr>
+              <a:t>Show kitchen sink </a:t>
+            </a:r>
+            <a:r>
+              <a:rPr lang="en-US" b="1" dirty="0" err="1" smtClean="0">
+                <a:solidFill>
+                  <a:srgbClr val="000000"/>
+                </a:solidFill>
+                <a:latin typeface="Lucida Grande" charset="0"/>
+                <a:ea typeface="ＭＳ Ｐゴシック" charset="0"/>
+                <a:cs typeface="Lucida Grande" charset="0"/>
+                <a:sym typeface="Lucida Grande" charset="0"/>
+              </a:rPr>
+              <a:t>tiapp.xml</a:t>
+            </a:r>
+            <a:r>
+              <a:rPr lang="en-US" b="1" dirty="0" smtClean="0">
+                <a:solidFill>
+                  <a:srgbClr val="000000"/>
+                </a:solidFill>
+                <a:latin typeface="Lucida Grande" charset="0"/>
+                <a:ea typeface="ＭＳ Ｐゴシック" charset="0"/>
+                <a:cs typeface="Lucida Grande" charset="0"/>
+                <a:sym typeface="Lucida Grande" charset="0"/>
+              </a:rPr>
+              <a:t> – activity &amp; services configurations</a:t>
+            </a:r>
+          </a:p>
+          <a:p>
+            <a:pPr marL="250825" indent="-171450" eaLnBrk="1" hangingPunct="1">
+              <a:buFontTx/>
+              <a:buChar char="-"/>
+            </a:pPr>
+            <a:r>
+              <a:rPr lang="en-US" b="1" dirty="0" smtClean="0">
+                <a:solidFill>
+                  <a:srgbClr val="000000"/>
+                </a:solidFill>
+                <a:latin typeface="Lucida Grande" charset="0"/>
+                <a:ea typeface="ＭＳ Ｐゴシック" charset="0"/>
+                <a:cs typeface="Lucida Grande" charset="0"/>
+                <a:sym typeface="Lucida Grande" charset="0"/>
+              </a:rPr>
+              <a:t>Via finder, open KS/build/android/</a:t>
+            </a:r>
+            <a:r>
+              <a:rPr lang="en-US" b="1" dirty="0" err="1" smtClean="0">
+                <a:solidFill>
+                  <a:srgbClr val="000000"/>
+                </a:solidFill>
+                <a:latin typeface="Lucida Grande" charset="0"/>
+                <a:ea typeface="ＭＳ Ｐゴシック" charset="0"/>
+                <a:cs typeface="Lucida Grande" charset="0"/>
+                <a:sym typeface="Lucida Grande" charset="0"/>
+              </a:rPr>
+              <a:t>AndroidManifest.xml</a:t>
+            </a:r>
+            <a:endParaRPr lang="en-US" b="1" dirty="0" smtClean="0">
+              <a:solidFill>
+                <a:srgbClr val="000000"/>
+              </a:solidFill>
+              <a:latin typeface="Lucida Grande" charset="0"/>
+              <a:ea typeface="ＭＳ Ｐゴシック" charset="0"/>
+              <a:cs typeface="Lucida Grande" charset="0"/>
+              <a:sym typeface="Lucida Grande" charset="0"/>
+            </a:endParaRPr>
+          </a:p>
+          <a:p>
+            <a:pPr marL="250825" indent="-171450" eaLnBrk="1" hangingPunct="1">
+              <a:buFontTx/>
+              <a:buChar char="-"/>
+            </a:pPr>
+            <a:r>
+              <a:rPr lang="en-US" b="1" dirty="0" smtClean="0">
+                <a:solidFill>
+                  <a:srgbClr val="000000"/>
+                </a:solidFill>
+                <a:latin typeface="Lucida Grande" charset="0"/>
+                <a:ea typeface="ＭＳ Ｐゴシック" charset="0"/>
+                <a:cs typeface="Lucida Grande" charset="0"/>
+                <a:sym typeface="Lucida Grande" charset="0"/>
+              </a:rPr>
+              <a:t>&lt;intent-filter&gt; describes the capabilities of your activities</a:t>
+            </a:r>
+            <a:r>
+              <a:rPr lang="en-US" b="1" baseline="0" dirty="0" smtClean="0">
+                <a:solidFill>
+                  <a:srgbClr val="000000"/>
+                </a:solidFill>
+                <a:latin typeface="Lucida Grande" charset="0"/>
+                <a:ea typeface="ＭＳ Ｐゴシック" charset="0"/>
+                <a:cs typeface="Lucida Grande" charset="0"/>
+                <a:sym typeface="Lucida Grande" charset="0"/>
+              </a:rPr>
+              <a:t> so the OS knows what type of intents they could respond to</a:t>
+            </a:r>
+            <a:endParaRPr lang="en-US" b="1" dirty="0" smtClean="0">
+              <a:solidFill>
+                <a:srgbClr val="000000"/>
+              </a:solidFill>
+              <a:latin typeface="Lucida Grande" charset="0"/>
+              <a:ea typeface="ＭＳ Ｐゴシック" charset="0"/>
+              <a:cs typeface="Lucida Grande" charset="0"/>
+              <a:sym typeface="Lucida Grande" charset="0"/>
+            </a:endParaRPr>
+          </a:p>
+          <a:p>
+            <a:pPr marL="250825" indent="-171450" eaLnBrk="1" hangingPunct="1">
+              <a:buFontTx/>
+              <a:buChar char="-"/>
+            </a:pPr>
+            <a:r>
+              <a:rPr lang="en-US" b="1" dirty="0" smtClean="0">
+                <a:solidFill>
+                  <a:srgbClr val="000000"/>
+                </a:solidFill>
+                <a:latin typeface="Lucida Grande" charset="0"/>
+                <a:ea typeface="ＭＳ Ｐゴシック" charset="0"/>
+                <a:cs typeface="Lucida Grande" charset="0"/>
+                <a:sym typeface="Lucida Grande" charset="0"/>
+              </a:rPr>
+              <a:t>Explain how you could create a custom</a:t>
+            </a:r>
+            <a:r>
+              <a:rPr lang="en-US" b="1" baseline="0" dirty="0" smtClean="0">
+                <a:solidFill>
+                  <a:srgbClr val="000000"/>
+                </a:solidFill>
+                <a:latin typeface="Lucida Grande" charset="0"/>
+                <a:ea typeface="ＭＳ Ｐゴシック" charset="0"/>
+                <a:cs typeface="Lucida Grande" charset="0"/>
+                <a:sym typeface="Lucida Grande" charset="0"/>
+              </a:rPr>
+              <a:t> manifest </a:t>
+            </a:r>
+            <a:endParaRPr lang="en-US" b="1" dirty="0" smtClean="0">
+              <a:solidFill>
+                <a:srgbClr val="000000"/>
+              </a:solidFill>
+              <a:latin typeface="Lucida Grande" charset="0"/>
+              <a:ea typeface="ＭＳ Ｐゴシック" charset="0"/>
+              <a:cs typeface="Lucida Grande" charset="0"/>
+              <a:sym typeface="Lucida Grande" charset="0"/>
+            </a:endParaRPr>
+          </a:p>
+          <a:p>
+            <a:pPr marL="250825" indent="-171450" eaLnBrk="1" hangingPunct="1">
+              <a:buFontTx/>
+              <a:buChar char="-"/>
+            </a:pPr>
             <a:endParaRPr lang="en-US" b="1" dirty="0">
               <a:solidFill>
                 <a:srgbClr val="000000"/>
@@ -1340,6 +1817,48 @@
               <a:buFontTx/>
               <a:buChar char="-"/>
             </a:pPr>
+            <a:r>
+              <a:rPr lang="en-US" b="1" dirty="0" smtClean="0">
+                <a:solidFill>
+                  <a:srgbClr val="000000"/>
+                </a:solidFill>
+                <a:latin typeface="Lucida Grande" charset="0"/>
+                <a:ea typeface="ＭＳ Ｐゴシック" charset="0"/>
+                <a:cs typeface="Lucida Grande" charset="0"/>
+                <a:sym typeface="Lucida Grande" charset="0"/>
+              </a:rPr>
+              <a:t>A “heavyweight” window is Ti terminology for an</a:t>
+            </a:r>
+            <a:r>
+              <a:rPr lang="en-US" b="1" baseline="0" dirty="0" smtClean="0">
+                <a:solidFill>
+                  <a:srgbClr val="000000"/>
+                </a:solidFill>
+                <a:latin typeface="Lucida Grande" charset="0"/>
+                <a:ea typeface="ＭＳ Ｐゴシック" charset="0"/>
+                <a:cs typeface="Lucida Grande" charset="0"/>
+                <a:sym typeface="Lucida Grande" charset="0"/>
+              </a:rPr>
+              <a:t> Activity</a:t>
+            </a:r>
+          </a:p>
+          <a:p>
+            <a:pPr marL="250825" indent="-171450" eaLnBrk="1" hangingPunct="1">
+              <a:buFontTx/>
+              <a:buChar char="-"/>
+            </a:pPr>
+            <a:r>
+              <a:rPr lang="en-US" b="1" baseline="0" dirty="0" smtClean="0">
+                <a:solidFill>
+                  <a:srgbClr val="000000"/>
+                </a:solidFill>
+                <a:latin typeface="Lucida Grande" charset="0"/>
+                <a:ea typeface="ＭＳ Ｐゴシック" charset="0"/>
+                <a:cs typeface="Lucida Grande" charset="0"/>
+                <a:sym typeface="Lucida Grande" charset="0"/>
+              </a:rPr>
+              <a:t>You can have a lightweight window that isn’t exactly equivalent to an Activity</a:t>
+            </a:r>
             <a:endParaRPr lang="en-US" b="1" dirty="0">
               <a:solidFill>
                 <a:srgbClr val="000000"/>
@@ -1435,6 +1954,24 @@
               <a:buFontTx/>
               <a:buChar char="-"/>
             </a:pPr>
+            <a:r>
+              <a:rPr lang="en-US" b="1" dirty="0" smtClean="0">
+                <a:solidFill>
+                  <a:srgbClr val="000000"/>
+                </a:solidFill>
+                <a:latin typeface="Lucida Grande" charset="0"/>
+                <a:ea typeface="ＭＳ Ｐゴシック" charset="0"/>
+                <a:cs typeface="Lucida Grande" charset="0"/>
+                <a:sym typeface="Lucida Grande" charset="0"/>
+              </a:rPr>
+              <a:t>See KS – android_menu1, 2, and 3</a:t>
+            </a:r>
+          </a:p>
+          <a:p>
+            <a:pPr marL="250825" indent="-171450" eaLnBrk="1" hangingPunct="1">
+              <a:buFontTx/>
+              <a:buChar char="-"/>
+            </a:pPr>
             <a:endParaRPr lang="en-US" b="1" dirty="0">
               <a:solidFill>
                 <a:srgbClr val="000000"/>
@@ -1530,6 +2067,30 @@
               <a:buFontTx/>
               <a:buChar char="-"/>
             </a:pPr>
+            <a:r>
+              <a:rPr lang="en-US" b="1" dirty="0" smtClean="0">
+                <a:solidFill>
+                  <a:srgbClr val="000000"/>
+                </a:solidFill>
+                <a:latin typeface="Lucida Grande" charset="0"/>
+                <a:ea typeface="ＭＳ Ｐゴシック" charset="0"/>
+                <a:cs typeface="Lucida Grande" charset="0"/>
+                <a:sym typeface="Lucida Grande" charset="0"/>
+              </a:rPr>
+              <a:t>KS: </a:t>
+            </a:r>
+            <a:r>
+              <a:rPr lang="en-US" b="1" dirty="0" err="1" smtClean="0">
+                <a:solidFill>
+                  <a:srgbClr val="000000"/>
+                </a:solidFill>
+                <a:latin typeface="Lucida Grande" charset="0"/>
+                <a:ea typeface="ＭＳ Ｐゴシック" charset="0"/>
+                <a:cs typeface="Lucida Grande" charset="0"/>
+                <a:sym typeface="Lucida Grande" charset="0"/>
+              </a:rPr>
+              <a:t>label_linkify.js</a:t>
+            </a:r>
             <a:endParaRPr lang="en-US" b="1" dirty="0">
               <a:solidFill>
                 <a:srgbClr val="000000"/>
@@ -1625,6 +2186,30 @@
               <a:buFontTx/>
               <a:buChar char="-"/>
             </a:pPr>
+            <a:r>
+              <a:rPr lang="en-US" b="1" dirty="0" smtClean="0">
+                <a:solidFill>
+                  <a:srgbClr val="000000"/>
+                </a:solidFill>
+                <a:latin typeface="Lucida Grande" charset="0"/>
+                <a:ea typeface="ＭＳ Ｐゴシック" charset="0"/>
+                <a:cs typeface="Lucida Grande" charset="0"/>
+                <a:sym typeface="Lucida Grande" charset="0"/>
+              </a:rPr>
+              <a:t>KS: </a:t>
+            </a:r>
+            <a:r>
+              <a:rPr lang="en-US" b="1" dirty="0" err="1" smtClean="0">
+                <a:solidFill>
+                  <a:srgbClr val="000000"/>
+                </a:solidFill>
+                <a:latin typeface="Lucida Grande" charset="0"/>
+                <a:ea typeface="ＭＳ Ｐゴシック" charset="0"/>
+                <a:cs typeface="Lucida Grande" charset="0"/>
+                <a:sym typeface="Lucida Grande" charset="0"/>
+              </a:rPr>
+              <a:t>notification.js</a:t>
+            </a:r>
             <a:endParaRPr lang="en-US" b="1" dirty="0">
               <a:solidFill>
                 <a:srgbClr val="000000"/>
@@ -1812,6 +2397,42 @@
               <a:buFontTx/>
               <a:buChar char="-"/>
             </a:pPr>
+            <a:r>
+              <a:rPr lang="en-US" b="1" dirty="0" smtClean="0">
+                <a:solidFill>
+                  <a:srgbClr val="000000"/>
+                </a:solidFill>
+                <a:latin typeface="Lucida Grande" charset="0"/>
+                <a:ea typeface="ＭＳ Ｐゴシック" charset="0"/>
+                <a:cs typeface="Lucida Grande" charset="0"/>
+                <a:sym typeface="Lucida Grande" charset="0"/>
+              </a:rPr>
+              <a:t>See </a:t>
+            </a:r>
+            <a:r>
+              <a:rPr lang="en-US" b="1" dirty="0" err="1" smtClean="0">
+                <a:solidFill>
+                  <a:srgbClr val="000000"/>
+                </a:solidFill>
+                <a:latin typeface="Lucida Grande" charset="0"/>
+                <a:ea typeface="ＭＳ Ｐゴシック" charset="0"/>
+                <a:cs typeface="Lucida Grande" charset="0"/>
+                <a:sym typeface="Lucida Grande" charset="0"/>
+              </a:rPr>
+              <a:t>TiDemo</a:t>
+            </a:r>
+            <a:r>
+              <a:rPr lang="en-US" b="1" baseline="0" dirty="0" smtClean="0">
+                <a:solidFill>
+                  <a:srgbClr val="000000"/>
+                </a:solidFill>
+                <a:latin typeface="Lucida Grande" charset="0"/>
+                <a:ea typeface="ＭＳ Ｐゴシック" charset="0"/>
+                <a:cs typeface="Lucida Grande" charset="0"/>
+                <a:sym typeface="Lucida Grande" charset="0"/>
+              </a:rPr>
+              <a:t> project</a:t>
+            </a:r>
             <a:endParaRPr lang="en-US" b="1" dirty="0">
               <a:solidFill>
                 <a:srgbClr val="000000"/>
@@ -2098,6 +2719,30 @@
               <a:buFontTx/>
               <a:buChar char="-"/>
             </a:pPr>
+            <a:r>
+              <a:rPr lang="en-US" b="1" dirty="0" smtClean="0">
+                <a:solidFill>
+                  <a:srgbClr val="000000"/>
+                </a:solidFill>
+                <a:latin typeface="Lucida Grande" charset="0"/>
+                <a:ea typeface="ＭＳ Ｐゴシック" charset="0"/>
+                <a:cs typeface="Lucida Grande" charset="0"/>
+                <a:sym typeface="Lucida Grande" charset="0"/>
+              </a:rPr>
+              <a:t>See KS: </a:t>
+            </a:r>
+            <a:r>
+              <a:rPr lang="en-US" b="1" dirty="0" err="1" smtClean="0">
+                <a:solidFill>
+                  <a:srgbClr val="000000"/>
+                </a:solidFill>
+                <a:latin typeface="Lucida Grande" charset="0"/>
+                <a:ea typeface="ＭＳ Ｐゴシック" charset="0"/>
+                <a:cs typeface="Lucida Grande" charset="0"/>
+                <a:sym typeface="Lucida Grande" charset="0"/>
+              </a:rPr>
+              <a:t>android_services.js</a:t>
+            </a:r>
             <a:endParaRPr lang="en-US" b="1" dirty="0">
               <a:solidFill>
                 <a:srgbClr val="000000"/>
@@ -2288,6 +2933,186 @@
               <a:buFontTx/>
               <a:buChar char="-"/>
             </a:pPr>
+            <a:r>
+              <a:rPr lang="en-US" b="1" dirty="0" smtClean="0">
+                <a:solidFill>
+                  <a:srgbClr val="000000"/>
+                </a:solidFill>
+                <a:latin typeface="Lucida Grande" charset="0"/>
+                <a:ea typeface="ＭＳ Ｐゴシック" charset="0"/>
+                <a:cs typeface="Lucida Grande" charset="0"/>
+                <a:sym typeface="Lucida Grande" charset="0"/>
+              </a:rPr>
+              <a:t>R is the class that represents resources in your app</a:t>
+            </a:r>
+          </a:p>
+          <a:p>
+            <a:pPr marL="250825" indent="-171450" eaLnBrk="1" hangingPunct="1">
+              <a:buFontTx/>
+              <a:buChar char="-"/>
+            </a:pPr>
+            <a:r>
+              <a:rPr lang="en-US" b="1" dirty="0" smtClean="0">
+                <a:solidFill>
+                  <a:srgbClr val="000000"/>
+                </a:solidFill>
+                <a:latin typeface="Lucida Grande" charset="0"/>
+                <a:ea typeface="ＭＳ Ｐゴシック" charset="0"/>
+                <a:cs typeface="Lucida Grande" charset="0"/>
+                <a:sym typeface="Lucida Grande" charset="0"/>
+              </a:rPr>
+              <a:t>Resources are assets, such as images, strings, layouts, animations, </a:t>
+            </a:r>
+            <a:r>
+              <a:rPr lang="en-US" b="1" dirty="0" err="1" smtClean="0">
+                <a:solidFill>
+                  <a:srgbClr val="000000"/>
+                </a:solidFill>
+                <a:latin typeface="Lucida Grande" charset="0"/>
+                <a:ea typeface="ＭＳ Ｐゴシック" charset="0"/>
+                <a:cs typeface="Lucida Grande" charset="0"/>
+                <a:sym typeface="Lucida Grande" charset="0"/>
+              </a:rPr>
+              <a:t>etc</a:t>
+            </a:r>
+            <a:r>
+              <a:rPr lang="en-US" b="1" dirty="0" smtClean="0">
+                <a:solidFill>
+                  <a:srgbClr val="000000"/>
+                </a:solidFill>
+                <a:latin typeface="Lucida Grande" charset="0"/>
+                <a:ea typeface="ＭＳ Ｐゴシック" charset="0"/>
+                <a:cs typeface="Lucida Grande" charset="0"/>
+                <a:sym typeface="Lucida Grande" charset="0"/>
+              </a:rPr>
+              <a:t> that are maintained external from your app so that you can swap, maintain, management outside</a:t>
+            </a:r>
+            <a:r>
+              <a:rPr lang="en-US" b="1" baseline="0" dirty="0" smtClean="0">
+                <a:solidFill>
+                  <a:srgbClr val="000000"/>
+                </a:solidFill>
+                <a:latin typeface="Lucida Grande" charset="0"/>
+                <a:ea typeface="ＭＳ Ｐゴシック" charset="0"/>
+                <a:cs typeface="Lucida Grande" charset="0"/>
+                <a:sym typeface="Lucida Grande" charset="0"/>
+              </a:rPr>
+              <a:t> of your code</a:t>
+            </a:r>
+          </a:p>
+          <a:p>
+            <a:pPr marL="250825" indent="-171450" eaLnBrk="1" hangingPunct="1">
+              <a:buFontTx/>
+              <a:buChar char="-"/>
+            </a:pPr>
+            <a:r>
+              <a:rPr lang="en-US" b="1" dirty="0" smtClean="0">
+                <a:solidFill>
+                  <a:srgbClr val="000000"/>
+                </a:solidFill>
+                <a:latin typeface="Lucida Grande" charset="0"/>
+                <a:ea typeface="ＭＳ Ｐゴシック" charset="0"/>
+                <a:cs typeface="Lucida Grande" charset="0"/>
+                <a:sym typeface="Lucida Grande" charset="0"/>
+              </a:rPr>
+              <a:t>Accessible in Ti. via </a:t>
+            </a:r>
+            <a:r>
+              <a:rPr lang="en-US" b="1" dirty="0" err="1" smtClean="0">
+                <a:solidFill>
+                  <a:srgbClr val="000000"/>
+                </a:solidFill>
+                <a:latin typeface="Lucida Grande" charset="0"/>
+                <a:ea typeface="ＭＳ Ｐゴシック" charset="0"/>
+                <a:cs typeface="Lucida Grande" charset="0"/>
+                <a:sym typeface="Lucida Grande" charset="0"/>
+              </a:rPr>
+              <a:t>Android.R</a:t>
+            </a:r>
+            <a:r>
+              <a:rPr lang="en-US" b="1" dirty="0" smtClean="0">
+                <a:solidFill>
+                  <a:srgbClr val="000000"/>
+                </a:solidFill>
+                <a:latin typeface="Lucida Grande" charset="0"/>
+                <a:ea typeface="ＭＳ Ｐゴシック" charset="0"/>
+                <a:cs typeface="Lucida Grande" charset="0"/>
+                <a:sym typeface="Lucida Grande" charset="0"/>
+              </a:rPr>
+              <a:t> class, see http://</a:t>
+            </a:r>
+            <a:r>
+              <a:rPr lang="en-US" b="1" dirty="0" err="1" smtClean="0">
+                <a:solidFill>
+                  <a:srgbClr val="000000"/>
+                </a:solidFill>
+                <a:latin typeface="Lucida Grande" charset="0"/>
+                <a:ea typeface="ＭＳ Ｐゴシック" charset="0"/>
+                <a:cs typeface="Lucida Grande" charset="0"/>
+                <a:sym typeface="Lucida Grande" charset="0"/>
+              </a:rPr>
+              <a:t>developer.appcelerator.com</a:t>
+            </a:r>
+            <a:r>
+              <a:rPr lang="en-US" b="1" dirty="0" smtClean="0">
+                <a:solidFill>
+                  <a:srgbClr val="000000"/>
+                </a:solidFill>
+                <a:latin typeface="Lucida Grande" charset="0"/>
+                <a:ea typeface="ＭＳ Ｐゴシック" charset="0"/>
+                <a:cs typeface="Lucida Grande" charset="0"/>
+                <a:sym typeface="Lucida Grande" charset="0"/>
+              </a:rPr>
+              <a:t>/</a:t>
+            </a:r>
+            <a:r>
+              <a:rPr lang="en-US" b="1" dirty="0" err="1" smtClean="0">
+                <a:solidFill>
+                  <a:srgbClr val="000000"/>
+                </a:solidFill>
+                <a:latin typeface="Lucida Grande" charset="0"/>
+                <a:ea typeface="ＭＳ Ｐゴシック" charset="0"/>
+                <a:cs typeface="Lucida Grande" charset="0"/>
+                <a:sym typeface="Lucida Grande" charset="0"/>
+              </a:rPr>
+              <a:t>apidoc</a:t>
+            </a:r>
+            <a:r>
+              <a:rPr lang="en-US" b="1" dirty="0" smtClean="0">
+                <a:solidFill>
+                  <a:srgbClr val="000000"/>
+                </a:solidFill>
+                <a:latin typeface="Lucida Grande" charset="0"/>
+                <a:ea typeface="ＭＳ Ｐゴシック" charset="0"/>
+                <a:cs typeface="Lucida Grande" charset="0"/>
+                <a:sym typeface="Lucida Grande" charset="0"/>
+              </a:rPr>
+              <a:t>/mobile/latest/</a:t>
+            </a:r>
+            <a:r>
+              <a:rPr lang="en-US" b="1" dirty="0" err="1" smtClean="0">
+                <a:solidFill>
+                  <a:srgbClr val="000000"/>
+                </a:solidFill>
+                <a:latin typeface="Lucida Grande" charset="0"/>
+                <a:ea typeface="ＭＳ Ｐゴシック" charset="0"/>
+                <a:cs typeface="Lucida Grande" charset="0"/>
+                <a:sym typeface="Lucida Grande" charset="0"/>
+              </a:rPr>
+              <a:t>Titanium.App.Android.R</a:t>
+            </a:r>
+            <a:r>
+              <a:rPr lang="en-US" b="1" dirty="0" smtClean="0">
+                <a:solidFill>
+                  <a:srgbClr val="000000"/>
+                </a:solidFill>
+                <a:latin typeface="Lucida Grande" charset="0"/>
+                <a:ea typeface="ＭＳ Ｐゴシック" charset="0"/>
+                <a:cs typeface="Lucida Grande" charset="0"/>
+                <a:sym typeface="Lucida Grande" charset="0"/>
+              </a:rPr>
+              <a:t>-object</a:t>
+            </a:r>
             <a:endParaRPr lang="en-US" b="1" dirty="0">
               <a:solidFill>
                 <a:srgbClr val="000000"/>
@@ -3191,6 +4016,78 @@
               <a:buFontTx/>
               <a:buChar char="-"/>
             </a:pPr>
+            <a:r>
+              <a:rPr lang="en-US" b="1" dirty="0" smtClean="0">
+                <a:solidFill>
+                  <a:srgbClr val="000000"/>
+                </a:solidFill>
+                <a:latin typeface="Lucida Grande" charset="0"/>
+                <a:ea typeface="ＭＳ Ｐゴシック" charset="0"/>
+                <a:cs typeface="Lucida Grande" charset="0"/>
+                <a:sym typeface="Lucida Grande" charset="0"/>
+              </a:rPr>
+              <a:t>An app is</a:t>
+            </a:r>
+            <a:r>
+              <a:rPr lang="en-US" b="1" baseline="0" dirty="0" smtClean="0">
+                <a:solidFill>
+                  <a:srgbClr val="000000"/>
+                </a:solidFill>
+                <a:latin typeface="Lucida Grande" charset="0"/>
+                <a:ea typeface="ＭＳ Ｐゴシック" charset="0"/>
+                <a:cs typeface="Lucida Grande" charset="0"/>
+                <a:sym typeface="Lucida Grande" charset="0"/>
+              </a:rPr>
+              <a:t> made up from one or more activities: one to list email messages, one to compose a message, one to read a message, etc.</a:t>
+            </a:r>
+          </a:p>
+          <a:p>
+            <a:pPr marL="250825" indent="-171450" eaLnBrk="1" hangingPunct="1">
+              <a:buFontTx/>
+              <a:buChar char="-"/>
+            </a:pPr>
+            <a:r>
+              <a:rPr lang="en-US" b="1" baseline="0" dirty="0" smtClean="0">
+                <a:solidFill>
+                  <a:srgbClr val="000000"/>
+                </a:solidFill>
+                <a:latin typeface="Lucida Grande" charset="0"/>
+                <a:ea typeface="ＭＳ Ｐゴシック" charset="0"/>
+                <a:cs typeface="Lucida Grande" charset="0"/>
+                <a:sym typeface="Lucida Grande" charset="0"/>
+              </a:rPr>
+              <a:t>Other apps can start an activity within your app and your app can start activities in other apps</a:t>
+            </a:r>
+          </a:p>
+          <a:p>
+            <a:pPr marL="250825" indent="-171450" eaLnBrk="1" hangingPunct="1">
+              <a:buFontTx/>
+              <a:buChar char="-"/>
+            </a:pPr>
+            <a:r>
+              <a:rPr lang="en-US" b="1" dirty="0" smtClean="0">
+                <a:solidFill>
+                  <a:srgbClr val="000000"/>
+                </a:solidFill>
+                <a:latin typeface="Lucida Grande" charset="0"/>
+                <a:ea typeface="ＭＳ Ｐゴシック" charset="0"/>
+                <a:cs typeface="Lucida Grande" charset="0"/>
+                <a:sym typeface="Lucida Grande" charset="0"/>
+              </a:rPr>
+              <a:t>This</a:t>
+            </a:r>
+            <a:r>
+              <a:rPr lang="en-US" b="1" baseline="0" dirty="0" smtClean="0">
+                <a:solidFill>
+                  <a:srgbClr val="000000"/>
+                </a:solidFill>
+                <a:latin typeface="Lucida Grande" charset="0"/>
+                <a:ea typeface="ＭＳ Ｐゴシック" charset="0"/>
+                <a:cs typeface="Lucida Grande" charset="0"/>
+                <a:sym typeface="Lucida Grande" charset="0"/>
+              </a:rPr>
+              <a:t> gives a way to share functionality and make it appear to be part of your app</a:t>
+            </a:r>
             <a:endParaRPr lang="en-US" b="1" dirty="0">
               <a:solidFill>
                 <a:srgbClr val="000000"/>
@@ -3621,7 +4518,7 @@
               <a:pPr>
                 <a:defRPr/>
               </a:pPr>
-              <a:t>6/15/11</a:t>
+              <a:t>6/21/11</a:t>
             </a:fld>
             <a:endParaRPr lang="en-US"/>
           </a:p>
@@ -4042,7 +4939,7 @@
               <a:pPr>
                 <a:defRPr/>
               </a:pPr>
-              <a:t>6/15/11</a:t>
+              <a:t>6/21/11</a:t>
             </a:fld>
             <a:endParaRPr lang="en-US"/>
           </a:p>
@@ -4767,7 +5664,7 @@
               <a:pPr>
                 <a:defRPr/>
               </a:pPr>
-              <a:t>6/15/11</a:t>
+              <a:t>6/21/11</a:t>
             </a:fld>
             <a:endParaRPr lang="en-US"/>
           </a:p>
@@ -5320,7 +6217,7 @@
               <a:pPr>
                 <a:defRPr/>
               </a:pPr>
-              <a:t>6/15/11</a:t>
+              <a:t>6/21/11</a:t>
             </a:fld>
             <a:endParaRPr lang="en-US"/>
           </a:p>
@@ -5671,7 +6568,7 @@
               <a:pPr>
                 <a:defRPr/>
               </a:pPr>
-              <a:t>6/15/11</a:t>
+              <a:t>6/21/11</a:t>
             </a:fld>
             <a:endParaRPr lang="en-US"/>
           </a:p>
@@ -6029,7 +6926,7 @@
               <a:pPr>
                 <a:defRPr/>
               </a:pPr>
-              <a:t>6/15/11</a:t>
+              <a:t>6/21/11</a:t>
             </a:fld>
             <a:endParaRPr lang="en-US"/>
           </a:p>
@@ -6264,7 +7161,7 @@
               <a:pPr>
                 <a:defRPr/>
               </a:pPr>
-              <a:t>6/15/11</a:t>
+              <a:t>6/21/11</a:t>
             </a:fld>
             <a:endParaRPr lang="en-US"/>
           </a:p>
@@ -6556,7 +7453,7 @@
               <a:pPr>
                 <a:defRPr/>
               </a:pPr>
-              <a:t>6/15/11</a:t>
+              <a:t>6/21/11</a:t>
             </a:fld>
             <a:endParaRPr lang="en-US"/>
           </a:p>
@@ -7788,11 +8685,6 @@
               </a:rPr>
               <a:t>“A Service is an application component representing either an application's desire to perform a longer-running operation while not interacting with the user or to supply functionality for other applications to use.”</a:t>
             </a:r>
-            <a:endParaRPr lang="en-US" dirty="0">
-              <a:latin typeface="Trebuchet MS" charset="0"/>
-              <a:ea typeface="ヒラギノ角ゴ ProN W3" charset="0"/>
-              <a:cs typeface="ヒラギノ角ゴ ProN W3" charset="0"/>
-            </a:endParaRPr>
           </a:p>
           <a:p>
             <a:pPr eaLnBrk="1" hangingPunct="1"/>
@@ -8142,11 +9034,6 @@
               </a:rPr>
               <a:t>“A broadcast receiver is a component that responds to system-wide broadcast announcements”</a:t>
             </a:r>
-            <a:endParaRPr lang="en-US" dirty="0">
-              <a:latin typeface="Trebuchet MS" charset="0"/>
-              <a:ea typeface="ヒラギノ角ゴ ProN W3" charset="0"/>
-              <a:cs typeface="ヒラギノ角ゴ ProN W3" charset="0"/>
-            </a:endParaRPr>
           </a:p>
           <a:p>
             <a:pPr eaLnBrk="1" hangingPunct="1"/>
@@ -8488,11 +9375,6 @@
               </a:rPr>
               <a:t>“Three of the core components of an application — activities, services, and broadcast receivers — are activated through messages, called intents.”</a:t>
             </a:r>
-            <a:endParaRPr lang="en-US" dirty="0">
-              <a:latin typeface="Trebuchet MS" charset="0"/>
-              <a:ea typeface="ヒラギノ角ゴ ProN W3" charset="0"/>
-              <a:cs typeface="ヒラギノ角ゴ ProN W3" charset="0"/>
-            </a:endParaRPr>
           </a:p>
           <a:p>
             <a:pPr eaLnBrk="1" hangingPunct="1"/>
@@ -9546,15 +10428,7 @@
                 <a:ea typeface="ヒラギノ角ゴ ProN W3" charset="0"/>
                 <a:cs typeface="ヒラギノ角ゴ ProN W3" charset="0"/>
               </a:rPr>
-              <a:t>Not quite as nimble as </a:t>
-            </a:r>
-            <a:r>
-              <a:rPr lang="en-US" dirty="0" smtClean="0">
-                <a:latin typeface="Trebuchet MS" charset="0"/>
-                <a:ea typeface="ヒラギノ角ゴ ProN W3" charset="0"/>
-                <a:cs typeface="ヒラギノ角ゴ ProN W3" charset="0"/>
-              </a:rPr>
-              <a:t>iOS windows in terms of animation</a:t>
+              <a:t>Not quite as nimble as iOS windows in terms of animation</a:t>
             </a:r>
           </a:p>
         </p:txBody>
@@ -12088,11 +12962,6 @@
               </a:rPr>
               <a:t>Can communicate with it from your main application</a:t>
             </a:r>
-            <a:endParaRPr lang="en-US" dirty="0" smtClean="0">
-              <a:latin typeface="Trebuchet MS" charset="0"/>
-              <a:ea typeface="ヒラギノ角ゴ ProN W3" charset="0"/>
-              <a:cs typeface="ヒラギノ角ゴ ProN W3" charset="0"/>
-            </a:endParaRPr>
           </a:p>
           <a:p>
             <a:pPr eaLnBrk="1" hangingPunct="1"/>
@@ -13498,11 +14367,6 @@
               </a:rPr>
               <a:t>Many great Google apps</a:t>
             </a:r>
-            <a:endParaRPr lang="en-US" dirty="0" smtClean="0">
-              <a:latin typeface="Trebuchet MS" charset="0"/>
-              <a:ea typeface="ヒラギノ角ゴ ProN W3" charset="0"/>
-              <a:cs typeface="ヒラギノ角ゴ ProN W3" charset="0"/>
-            </a:endParaRPr>
           </a:p>
         </p:txBody>
       </p:sp>

</xml_diff>